<commit_message>
Reviewed lectures when I studied for ML final
</commit_message>
<xml_diff>
--- a/Lectures/Lecture 15_Logistic Regression.pptx
+++ b/Lectures/Lecture 15_Logistic Regression.pptx
@@ -290,7 +290,7 @@
           <a:p>
             <a:fld id="{02B5D11C-A000-9242-84A9-48B920106DCB}" type="datetimeFigureOut">
               <a:rPr lang="en-US" smtClean="0"/>
-              <a:t>10/19/23</a:t>
+              <a:t>12/12/23</a:t>
             </a:fld>
             <a:endParaRPr lang="en-US"/>
           </a:p>
@@ -456,7 +456,7 @@
             <a:fld id="{1E00213A-4496-8E41-939D-6D779164903A}" type="datetimeFigureOut">
               <a:rPr lang="en-US" smtClean="0"/>
               <a:pPr/>
-              <a:t>10/19/23</a:t>
+              <a:t>12/12/23</a:t>
             </a:fld>
             <a:endParaRPr lang="en-US"/>
           </a:p>
@@ -1296,6 +1296,91 @@
 </p:notes>
 </file>
 
+<file path=ppt/notesSlides/notesSlide15.xml><?xml version="1.0" encoding="utf-8"?>
+<p:notes xmlns:a="http://schemas.openxmlformats.org/drawingml/2006/main" xmlns:r="http://schemas.openxmlformats.org/officeDocument/2006/relationships" xmlns:p="http://schemas.openxmlformats.org/presentationml/2006/main">
+  <p:cSld>
+    <p:spTree>
+      <p:nvGrpSpPr>
+        <p:cNvPr id="1" name=""/>
+        <p:cNvGrpSpPr/>
+        <p:nvPr/>
+      </p:nvGrpSpPr>
+      <p:grpSpPr>
+        <a:xfrm>
+          <a:off x="0" y="0"/>
+          <a:ext cx="0" cy="0"/>
+          <a:chOff x="0" y="0"/>
+          <a:chExt cx="0" cy="0"/>
+        </a:xfrm>
+      </p:grpSpPr>
+      <p:sp>
+        <p:nvSpPr>
+          <p:cNvPr id="2" name="Slide Image Placeholder 1"/>
+          <p:cNvSpPr>
+            <a:spLocks noGrp="1" noRot="1" noChangeAspect="1"/>
+          </p:cNvSpPr>
+          <p:nvPr>
+            <p:ph type="sldImg"/>
+          </p:nvPr>
+        </p:nvSpPr>
+        <p:spPr/>
+      </p:sp>
+      <p:sp>
+        <p:nvSpPr>
+          <p:cNvPr id="3" name="Notes Placeholder 2"/>
+          <p:cNvSpPr>
+            <a:spLocks noGrp="1"/>
+          </p:cNvSpPr>
+          <p:nvPr>
+            <p:ph type="body" idx="1"/>
+          </p:nvPr>
+        </p:nvSpPr>
+        <p:spPr/>
+        <p:txBody>
+          <a:bodyPr/>
+          <a:lstStyle/>
+          <a:p>
+            <a:endParaRPr lang="en-US" dirty="0"/>
+          </a:p>
+        </p:txBody>
+      </p:sp>
+      <p:sp>
+        <p:nvSpPr>
+          <p:cNvPr id="4" name="Slide Number Placeholder 3"/>
+          <p:cNvSpPr>
+            <a:spLocks noGrp="1"/>
+          </p:cNvSpPr>
+          <p:nvPr>
+            <p:ph type="sldNum" sz="quarter" idx="5"/>
+          </p:nvPr>
+        </p:nvSpPr>
+        <p:spPr/>
+        <p:txBody>
+          <a:bodyPr/>
+          <a:lstStyle/>
+          <a:p>
+            <a:fld id="{F93E9A50-EED1-FA4E-868B-D30F9FDBA6F4}" type="slidenum">
+              <a:rPr lang="en-US" smtClean="0"/>
+              <a:pPr/>
+              <a:t>80</a:t>
+            </a:fld>
+            <a:endParaRPr lang="en-US"/>
+          </a:p>
+        </p:txBody>
+      </p:sp>
+    </p:spTree>
+    <p:extLst>
+      <p:ext uri="{BB962C8B-B14F-4D97-AF65-F5344CB8AC3E}">
+        <p14:creationId xmlns:p14="http://schemas.microsoft.com/office/powerpoint/2010/main" val="3233174759"/>
+      </p:ext>
+    </p:extLst>
+  </p:cSld>
+  <p:clrMapOvr>
+    <a:masterClrMapping/>
+  </p:clrMapOvr>
+</p:notes>
+</file>
+
 <file path=ppt/notesSlides/notesSlide2.xml><?xml version="1.0" encoding="utf-8"?>
 <p:notes xmlns:a="http://schemas.openxmlformats.org/drawingml/2006/main" xmlns:r="http://schemas.openxmlformats.org/officeDocument/2006/relationships" xmlns:p="http://schemas.openxmlformats.org/presentationml/2006/main">
   <p:cSld>
@@ -2339,7 +2424,7 @@
             <a:fld id="{7B6FE768-D535-DB4F-A86D-18423950C428}" type="datetimeFigureOut">
               <a:rPr lang="en-US" smtClean="0"/>
               <a:pPr/>
-              <a:t>10/19/23</a:t>
+              <a:t>12/12/23</a:t>
             </a:fld>
             <a:endParaRPr lang="en-US"/>
           </a:p>
@@ -2531,7 +2616,7 @@
             <a:fld id="{7B6FE768-D535-DB4F-A86D-18423950C428}" type="datetimeFigureOut">
               <a:rPr lang="en-US" smtClean="0"/>
               <a:pPr/>
-              <a:t>10/19/23</a:t>
+              <a:t>12/12/23</a:t>
             </a:fld>
             <a:endParaRPr lang="en-US"/>
           </a:p>
@@ -2717,7 +2802,7 @@
             <a:fld id="{7B6FE768-D535-DB4F-A86D-18423950C428}" type="datetimeFigureOut">
               <a:rPr lang="en-US" smtClean="0"/>
               <a:pPr/>
-              <a:t>10/19/23</a:t>
+              <a:t>12/12/23</a:t>
             </a:fld>
             <a:endParaRPr lang="en-US"/>
           </a:p>
@@ -2981,7 +3066,7 @@
             <a:fld id="{7B6FE768-D535-DB4F-A86D-18423950C428}" type="datetimeFigureOut">
               <a:rPr lang="en-US" smtClean="0"/>
               <a:pPr/>
-              <a:t>10/19/23</a:t>
+              <a:t>12/12/23</a:t>
             </a:fld>
             <a:endParaRPr lang="en-US"/>
           </a:p>
@@ -3398,7 +3483,7 @@
             <a:fld id="{7B6FE768-D535-DB4F-A86D-18423950C428}" type="datetimeFigureOut">
               <a:rPr lang="en-US" smtClean="0"/>
               <a:pPr/>
-              <a:t>10/19/23</a:t>
+              <a:t>12/12/23</a:t>
             </a:fld>
             <a:endParaRPr lang="en-US"/>
           </a:p>
@@ -3641,7 +3726,7 @@
             <a:fld id="{7B6FE768-D535-DB4F-A86D-18423950C428}" type="datetimeFigureOut">
               <a:rPr lang="en-US" smtClean="0"/>
               <a:pPr/>
-              <a:t>10/19/23</a:t>
+              <a:t>12/12/23</a:t>
             </a:fld>
             <a:endParaRPr lang="en-US"/>
           </a:p>
@@ -3878,7 +3963,7 @@
             <a:fld id="{7B6FE768-D535-DB4F-A86D-18423950C428}" type="datetimeFigureOut">
               <a:rPr lang="en-US" smtClean="0"/>
               <a:pPr/>
-              <a:t>10/19/23</a:t>
+              <a:t>12/12/23</a:t>
             </a:fld>
             <a:endParaRPr lang="en-US"/>
           </a:p>
@@ -4074,7 +4159,7 @@
             <a:fld id="{7B6FE768-D535-DB4F-A86D-18423950C428}" type="datetimeFigureOut">
               <a:rPr lang="en-US" smtClean="0"/>
               <a:pPr/>
-              <a:t>10/19/23</a:t>
+              <a:t>12/12/23</a:t>
             </a:fld>
             <a:endParaRPr lang="en-US"/>
           </a:p>
@@ -4174,7 +4259,7 @@
             <a:fld id="{7B6FE768-D535-DB4F-A86D-18423950C428}" type="datetimeFigureOut">
               <a:rPr lang="en-US" smtClean="0"/>
               <a:pPr/>
-              <a:t>10/19/23</a:t>
+              <a:t>12/12/23</a:t>
             </a:fld>
             <a:endParaRPr lang="en-US"/>
           </a:p>
@@ -4311,7 +4396,7 @@
             <a:fld id="{7B6FE768-D535-DB4F-A86D-18423950C428}" type="datetimeFigureOut">
               <a:rPr lang="en-US" smtClean="0"/>
               <a:pPr/>
-              <a:t>10/19/23</a:t>
+              <a:t>12/12/23</a:t>
             </a:fld>
             <a:endParaRPr lang="en-US"/>
           </a:p>
@@ -4830,7 +4915,7 @@
             <a:fld id="{7B6FE768-D535-DB4F-A86D-18423950C428}" type="datetimeFigureOut">
               <a:rPr lang="en-US" smtClean="0"/>
               <a:pPr/>
-              <a:t>10/19/23</a:t>
+              <a:t>12/12/23</a:t>
             </a:fld>
             <a:endParaRPr lang="en-US"/>
           </a:p>
@@ -5091,7 +5176,7 @@
             <a:fld id="{7B6FE768-D535-DB4F-A86D-18423950C428}" type="datetimeFigureOut">
               <a:rPr lang="en-US" smtClean="0"/>
               <a:pPr/>
-              <a:t>10/19/23</a:t>
+              <a:t>12/12/23</a:t>
             </a:fld>
             <a:endParaRPr lang="en-US"/>
           </a:p>
@@ -6541,7 +6626,7 @@
                       <a:noFill/>
                       <a:extLst>
                         <a:ext uri="{909E8E84-426E-40dd-AFC4-6F175D3DCCD1}">
-                          <a14:hiddenFill xmlns="" xmlns:a14="http://schemas.microsoft.com/office/drawing/2010/main">
+                          <a14:hiddenFill xmlns:a14="http://schemas.microsoft.com/office/drawing/2010/main" xmlns="">
                             <a:solidFill>
                               <a:srgbClr val="FFFFFF"/>
                             </a:solidFill>
@@ -6605,7 +6690,7 @@
                       <a:noFill/>
                       <a:extLst>
                         <a:ext uri="{909E8E84-426E-40dd-AFC4-6F175D3DCCD1}">
-                          <a14:hiddenFill xmlns="" xmlns:a14="http://schemas.microsoft.com/office/drawing/2010/main">
+                          <a14:hiddenFill xmlns:a14="http://schemas.microsoft.com/office/drawing/2010/main" xmlns="">
                             <a:solidFill>
                               <a:srgbClr val="FFFFFF"/>
                             </a:solidFill>
@@ -7310,7 +7395,7 @@
                       <a:noFill/>
                       <a:extLst>
                         <a:ext uri="{909E8E84-426E-40dd-AFC4-6F175D3DCCD1}">
-                          <a14:hiddenFill xmlns="" xmlns:a14="http://schemas.microsoft.com/office/drawing/2010/main">
+                          <a14:hiddenFill xmlns:a14="http://schemas.microsoft.com/office/drawing/2010/main" xmlns="">
                             <a:solidFill>
                               <a:srgbClr val="FFFFFF"/>
                             </a:solidFill>
@@ -7828,7 +7913,7 @@
                       <a:noFill/>
                       <a:extLst>
                         <a:ext uri="{909E8E84-426E-40dd-AFC4-6F175D3DCCD1}">
-                          <a14:hiddenFill xmlns="" xmlns:a14="http://schemas.microsoft.com/office/drawing/2010/main">
+                          <a14:hiddenFill xmlns:a14="http://schemas.microsoft.com/office/drawing/2010/main" xmlns="">
                             <a:solidFill>
                               <a:srgbClr val="FFFFFF"/>
                             </a:solidFill>
@@ -8346,7 +8431,7 @@
                       <a:noFill/>
                       <a:extLst>
                         <a:ext uri="{909E8E84-426E-40dd-AFC4-6F175D3DCCD1}">
-                          <a14:hiddenFill xmlns="" xmlns:a14="http://schemas.microsoft.com/office/drawing/2010/main">
+                          <a14:hiddenFill xmlns:a14="http://schemas.microsoft.com/office/drawing/2010/main" xmlns="">
                             <a:solidFill>
                               <a:srgbClr val="FFFFFF"/>
                             </a:solidFill>
@@ -9058,7 +9143,7 @@
                       <a:noFill/>
                       <a:extLst>
                         <a:ext uri="{909E8E84-426E-40dd-AFC4-6F175D3DCCD1}">
-                          <a14:hiddenFill xmlns="" xmlns:a14="http://schemas.microsoft.com/office/drawing/2010/main">
+                          <a14:hiddenFill xmlns:a14="http://schemas.microsoft.com/office/drawing/2010/main" xmlns="">
                             <a:solidFill>
                               <a:srgbClr val="FFFFFF"/>
                             </a:solidFill>
@@ -9946,8 +10031,8 @@
           </a:graphicData>
         </a:graphic>
       </p:graphicFrame>
-      <mc:AlternateContent xmlns:mc="http://schemas.openxmlformats.org/markup-compatibility/2006">
-        <mc:Choice xmlns:a14="http://schemas.microsoft.com/office/drawing/2010/main" Requires="a14">
+      <mc:AlternateContent xmlns:mc="http://schemas.openxmlformats.org/markup-compatibility/2006" xmlns:a14="http://schemas.microsoft.com/office/drawing/2010/main">
+        <mc:Choice Requires="a14">
           <p:sp>
             <p:nvSpPr>
               <p:cNvPr id="8" name="TextBox 7">
@@ -9976,6 +10061,7 @@
               </a:bodyPr>
               <a:lstStyle/>
               <a:p>
+                <a:pPr/>
                 <a14:m>
                   <m:oMathPara xmlns:m="http://schemas.openxmlformats.org/officeDocument/2006/math">
                     <m:oMathParaPr>
@@ -10142,7 +10228,7 @@
             </p:txBody>
           </p:sp>
         </mc:Choice>
-        <mc:Fallback>
+        <mc:Fallback xmlns="">
           <p:sp>
             <p:nvSpPr>
               <p:cNvPr id="8" name="TextBox 7">
@@ -10187,8 +10273,8 @@
           </p:sp>
         </mc:Fallback>
       </mc:AlternateContent>
-      <mc:AlternateContent xmlns:mc="http://schemas.openxmlformats.org/markup-compatibility/2006">
-        <mc:Choice xmlns:a14="http://schemas.microsoft.com/office/drawing/2010/main" Requires="a14">
+      <mc:AlternateContent xmlns:mc="http://schemas.openxmlformats.org/markup-compatibility/2006" xmlns:a14="http://schemas.microsoft.com/office/drawing/2010/main">
+        <mc:Choice Requires="a14">
           <p:sp>
             <p:nvSpPr>
               <p:cNvPr id="9" name="TextBox 8">
@@ -10217,6 +10303,7 @@
               </a:bodyPr>
               <a:lstStyle/>
               <a:p>
+                <a:pPr/>
                 <a14:m>
                   <m:oMathPara xmlns:m="http://schemas.openxmlformats.org/officeDocument/2006/math">
                     <m:oMathParaPr>
@@ -10357,7 +10444,7 @@
             </p:txBody>
           </p:sp>
         </mc:Choice>
-        <mc:Fallback>
+        <mc:Fallback xmlns="">
           <p:sp>
             <p:nvSpPr>
               <p:cNvPr id="9" name="TextBox 8">
@@ -11032,8 +11119,8 @@
           </a:graphicData>
         </a:graphic>
       </p:graphicFrame>
-      <mc:AlternateContent xmlns:mc="http://schemas.openxmlformats.org/markup-compatibility/2006">
-        <mc:Choice xmlns:a14="http://schemas.microsoft.com/office/drawing/2010/main" Requires="a14">
+      <mc:AlternateContent xmlns:mc="http://schemas.openxmlformats.org/markup-compatibility/2006" xmlns:a14="http://schemas.microsoft.com/office/drawing/2010/main">
+        <mc:Choice Requires="a14">
           <p:sp>
             <p:nvSpPr>
               <p:cNvPr id="8" name="TextBox 7">
@@ -11062,6 +11149,7 @@
               </a:bodyPr>
               <a:lstStyle/>
               <a:p>
+                <a:pPr/>
                 <a14:m>
                   <m:oMathPara xmlns:m="http://schemas.openxmlformats.org/officeDocument/2006/math">
                     <m:oMathParaPr>
@@ -11229,7 +11317,7 @@
             </p:txBody>
           </p:sp>
         </mc:Choice>
-        <mc:Fallback>
+        <mc:Fallback xmlns="">
           <p:sp>
             <p:nvSpPr>
               <p:cNvPr id="8" name="TextBox 7">
@@ -11274,8 +11362,8 @@
           </p:sp>
         </mc:Fallback>
       </mc:AlternateContent>
-      <mc:AlternateContent xmlns:mc="http://schemas.openxmlformats.org/markup-compatibility/2006">
-        <mc:Choice xmlns:a14="http://schemas.microsoft.com/office/drawing/2010/main" Requires="a14">
+      <mc:AlternateContent xmlns:mc="http://schemas.openxmlformats.org/markup-compatibility/2006" xmlns:a14="http://schemas.microsoft.com/office/drawing/2010/main">
+        <mc:Choice Requires="a14">
           <p:sp>
             <p:nvSpPr>
               <p:cNvPr id="9" name="TextBox 8">
@@ -11304,6 +11392,7 @@
               </a:bodyPr>
               <a:lstStyle/>
               <a:p>
+                <a:pPr/>
                 <a14:m>
                   <m:oMathPara xmlns:m="http://schemas.openxmlformats.org/officeDocument/2006/math">
                     <m:oMathParaPr>
@@ -11662,7 +11751,7 @@
             </p:txBody>
           </p:sp>
         </mc:Choice>
-        <mc:Fallback>
+        <mc:Fallback xmlns="">
           <p:sp>
             <p:nvSpPr>
               <p:cNvPr id="9" name="TextBox 8">
@@ -11707,8 +11796,8 @@
           </p:sp>
         </mc:Fallback>
       </mc:AlternateContent>
-      <mc:AlternateContent xmlns:mc="http://schemas.openxmlformats.org/markup-compatibility/2006">
-        <mc:Choice xmlns:a14="http://schemas.microsoft.com/office/drawing/2010/main" Requires="a14">
+      <mc:AlternateContent xmlns:mc="http://schemas.openxmlformats.org/markup-compatibility/2006" xmlns:a14="http://schemas.microsoft.com/office/drawing/2010/main">
+        <mc:Choice Requires="a14">
           <p:sp>
             <p:nvSpPr>
               <p:cNvPr id="3" name="TextBox 2">
@@ -11844,7 +11933,7 @@
             </p:txBody>
           </p:sp>
         </mc:Choice>
-        <mc:Fallback>
+        <mc:Fallback xmlns="">
           <p:sp>
             <p:nvSpPr>
               <p:cNvPr id="3" name="TextBox 2">
@@ -11889,8 +11978,8 @@
           </p:sp>
         </mc:Fallback>
       </mc:AlternateContent>
-      <mc:AlternateContent xmlns:mc="http://schemas.openxmlformats.org/markup-compatibility/2006">
-        <mc:Choice xmlns:a14="http://schemas.microsoft.com/office/drawing/2010/main" Requires="a14">
+      <mc:AlternateContent xmlns:mc="http://schemas.openxmlformats.org/markup-compatibility/2006" xmlns:a14="http://schemas.microsoft.com/office/drawing/2010/main">
+        <mc:Choice Requires="a14">
           <p:sp>
             <p:nvSpPr>
               <p:cNvPr id="5" name="TextBox 4">
@@ -11983,7 +12072,7 @@
             </p:txBody>
           </p:sp>
         </mc:Choice>
-        <mc:Fallback>
+        <mc:Fallback xmlns="">
           <p:sp>
             <p:nvSpPr>
               <p:cNvPr id="5" name="TextBox 4">
@@ -12782,8 +12871,8 @@
           </a:graphicData>
         </a:graphic>
       </p:graphicFrame>
-      <mc:AlternateContent xmlns:mc="http://schemas.openxmlformats.org/markup-compatibility/2006">
-        <mc:Choice xmlns:a14="http://schemas.microsoft.com/office/drawing/2010/main" Requires="a14">
+      <mc:AlternateContent xmlns:mc="http://schemas.openxmlformats.org/markup-compatibility/2006" xmlns:a14="http://schemas.microsoft.com/office/drawing/2010/main">
+        <mc:Choice Requires="a14">
           <p:sp>
             <p:nvSpPr>
               <p:cNvPr id="8" name="TextBox 7">
@@ -12812,6 +12901,7 @@
               </a:bodyPr>
               <a:lstStyle/>
               <a:p>
+                <a:pPr/>
                 <a14:m>
                   <m:oMathPara xmlns:m="http://schemas.openxmlformats.org/officeDocument/2006/math">
                     <m:oMathParaPr>
@@ -12978,7 +13068,7 @@
             </p:txBody>
           </p:sp>
         </mc:Choice>
-        <mc:Fallback>
+        <mc:Fallback xmlns="">
           <p:sp>
             <p:nvSpPr>
               <p:cNvPr id="8" name="TextBox 7">
@@ -13023,8 +13113,8 @@
           </p:sp>
         </mc:Fallback>
       </mc:AlternateContent>
-      <mc:AlternateContent xmlns:mc="http://schemas.openxmlformats.org/markup-compatibility/2006">
-        <mc:Choice xmlns:a14="http://schemas.microsoft.com/office/drawing/2010/main" Requires="a14">
+      <mc:AlternateContent xmlns:mc="http://schemas.openxmlformats.org/markup-compatibility/2006" xmlns:a14="http://schemas.microsoft.com/office/drawing/2010/main">
+        <mc:Choice Requires="a14">
           <p:sp>
             <p:nvSpPr>
               <p:cNvPr id="3" name="TextBox 2">
@@ -13053,6 +13143,7 @@
               </a:bodyPr>
               <a:lstStyle/>
               <a:p>
+                <a:pPr/>
                 <a14:m>
                   <m:oMathPara xmlns:m="http://schemas.openxmlformats.org/officeDocument/2006/math">
                     <m:oMathParaPr>
@@ -13193,7 +13284,7 @@
             </p:txBody>
           </p:sp>
         </mc:Choice>
-        <mc:Fallback>
+        <mc:Fallback xmlns="">
           <p:sp>
             <p:nvSpPr>
               <p:cNvPr id="3" name="TextBox 2">
@@ -13973,8 +14064,8 @@
           </a:graphicData>
         </a:graphic>
       </p:graphicFrame>
-      <mc:AlternateContent xmlns:mc="http://schemas.openxmlformats.org/markup-compatibility/2006">
-        <mc:Choice xmlns:a14="http://schemas.microsoft.com/office/drawing/2010/main" Requires="a14">
+      <mc:AlternateContent xmlns:mc="http://schemas.openxmlformats.org/markup-compatibility/2006" xmlns:a14="http://schemas.microsoft.com/office/drawing/2010/main">
+        <mc:Choice Requires="a14">
           <p:sp>
             <p:nvSpPr>
               <p:cNvPr id="8" name="TextBox 7">
@@ -14003,6 +14094,7 @@
               </a:bodyPr>
               <a:lstStyle/>
               <a:p>
+                <a:pPr/>
                 <a14:m>
                   <m:oMathPara xmlns:m="http://schemas.openxmlformats.org/officeDocument/2006/math">
                     <m:oMathParaPr>
@@ -14169,7 +14261,7 @@
             </p:txBody>
           </p:sp>
         </mc:Choice>
-        <mc:Fallback>
+        <mc:Fallback xmlns="">
           <p:sp>
             <p:nvSpPr>
               <p:cNvPr id="8" name="TextBox 7">
@@ -14214,8 +14306,8 @@
           </p:sp>
         </mc:Fallback>
       </mc:AlternateContent>
-      <mc:AlternateContent xmlns:mc="http://schemas.openxmlformats.org/markup-compatibility/2006">
-        <mc:Choice xmlns:a14="http://schemas.microsoft.com/office/drawing/2010/main" Requires="a14">
+      <mc:AlternateContent xmlns:mc="http://schemas.openxmlformats.org/markup-compatibility/2006" xmlns:a14="http://schemas.microsoft.com/office/drawing/2010/main">
+        <mc:Choice Requires="a14">
           <p:sp>
             <p:nvSpPr>
               <p:cNvPr id="9" name="TextBox 8">
@@ -14244,6 +14336,7 @@
               </a:bodyPr>
               <a:lstStyle/>
               <a:p>
+                <a:pPr/>
                 <a14:m>
                   <m:oMathPara xmlns:m="http://schemas.openxmlformats.org/officeDocument/2006/math">
                     <m:oMathParaPr>
@@ -14388,6 +14481,7 @@
                 </a:endParaRPr>
               </a:p>
               <a:p>
+                <a:pPr/>
                 <a14:m>
                   <m:oMathPara xmlns:m="http://schemas.openxmlformats.org/officeDocument/2006/math">
                     <m:oMathParaPr>
@@ -14599,7 +14693,7 @@
             </p:txBody>
           </p:sp>
         </mc:Choice>
-        <mc:Fallback>
+        <mc:Fallback xmlns="">
           <p:sp>
             <p:nvSpPr>
               <p:cNvPr id="9" name="TextBox 8">
@@ -14644,8 +14738,8 @@
           </p:sp>
         </mc:Fallback>
       </mc:AlternateContent>
-      <mc:AlternateContent xmlns:mc="http://schemas.openxmlformats.org/markup-compatibility/2006">
-        <mc:Choice xmlns:a14="http://schemas.microsoft.com/office/drawing/2010/main" Requires="a14">
+      <mc:AlternateContent xmlns:mc="http://schemas.openxmlformats.org/markup-compatibility/2006" xmlns:a14="http://schemas.microsoft.com/office/drawing/2010/main">
+        <mc:Choice Requires="a14">
           <p:sp>
             <p:nvSpPr>
               <p:cNvPr id="3" name="TextBox 2">
@@ -14781,7 +14875,7 @@
             </p:txBody>
           </p:sp>
         </mc:Choice>
-        <mc:Fallback>
+        <mc:Fallback xmlns="">
           <p:sp>
             <p:nvSpPr>
               <p:cNvPr id="3" name="TextBox 2">
@@ -14826,8 +14920,8 @@
           </p:sp>
         </mc:Fallback>
       </mc:AlternateContent>
-      <mc:AlternateContent xmlns:mc="http://schemas.openxmlformats.org/markup-compatibility/2006">
-        <mc:Choice xmlns:a14="http://schemas.microsoft.com/office/drawing/2010/main" Requires="a14">
+      <mc:AlternateContent xmlns:mc="http://schemas.openxmlformats.org/markup-compatibility/2006" xmlns:a14="http://schemas.microsoft.com/office/drawing/2010/main">
+        <mc:Choice Requires="a14">
           <p:sp>
             <p:nvSpPr>
               <p:cNvPr id="5" name="TextBox 4">
@@ -14886,7 +14980,7 @@
             </p:txBody>
           </p:sp>
         </mc:Choice>
-        <mc:Fallback>
+        <mc:Fallback xmlns="">
           <p:sp>
             <p:nvSpPr>
               <p:cNvPr id="5" name="TextBox 4">
@@ -18374,7 +18468,7 @@
                       <a:noFill/>
                       <a:extLst>
                         <a:ext uri="{909E8E84-426E-40dd-AFC4-6F175D3DCCD1}">
-                          <a14:hiddenFill xmlns:a14="http://schemas.microsoft.com/office/drawing/2010/main" xmlns="">
+                          <a14:hiddenFill xmlns="" xmlns:a14="http://schemas.microsoft.com/office/drawing/2010/main">
                             <a:solidFill>
                               <a:srgbClr val="FFFFFF"/>
                             </a:solidFill>
@@ -21155,8 +21249,8 @@
           </a:p>
         </p:txBody>
       </p:sp>
-      <mc:AlternateContent xmlns:mc="http://schemas.openxmlformats.org/markup-compatibility/2006">
-        <mc:Choice xmlns:a14="http://schemas.microsoft.com/office/drawing/2010/main" Requires="a14">
+      <mc:AlternateContent xmlns:mc="http://schemas.openxmlformats.org/markup-compatibility/2006" xmlns:a14="http://schemas.microsoft.com/office/drawing/2010/main">
+        <mc:Choice Requires="a14">
           <p:sp>
             <p:nvSpPr>
               <p:cNvPr id="6" name="TextBox 5">
@@ -21185,6 +21279,7 @@
               </a:bodyPr>
               <a:lstStyle/>
               <a:p>
+                <a:pPr/>
                 <a14:m>
                   <m:oMathPara xmlns:m="http://schemas.openxmlformats.org/officeDocument/2006/math">
                     <m:oMathParaPr>
@@ -21296,7 +21391,7 @@
             </p:txBody>
           </p:sp>
         </mc:Choice>
-        <mc:Fallback>
+        <mc:Fallback xmlns="">
           <p:sp>
             <p:nvSpPr>
               <p:cNvPr id="6" name="TextBox 5">
@@ -23601,7 +23696,7 @@
             </a:pPr>
             <a:r>
               <a:rPr lang="en-US" dirty="0"/>
-              <a:t>Which model do we use, i.e. how do we calculate p(</a:t>
+              <a:t>Which model do we use, i.e., how do we calculate p(</a:t>
             </a:r>
             <a:r>
               <a:rPr lang="en-US" i="1" dirty="0"/>
@@ -23887,15 +23982,7 @@
           <a:p>
             <a:r>
               <a:rPr lang="en-US" dirty="0"/>
-              <a:t>Joint models </a:t>
-            </a:r>
-            <a:r>
-              <a:rPr lang="en-US" dirty="0" err="1"/>
-              <a:t>vs</a:t>
-            </a:r>
-            <a:r>
-              <a:rPr lang="en-US" dirty="0"/>
-              <a:t> conditional models</a:t>
+              <a:t>Joint models vs conditional models</a:t>
             </a:r>
           </a:p>
         </p:txBody>
@@ -24179,7 +24266,7 @@
                       <a:noFill/>
                       <a:extLst>
                         <a:ext uri="{909E8E84-426E-40dd-AFC4-6F175D3DCCD1}">
-                          <a14:hiddenFill xmlns:a14="http://schemas.microsoft.com/office/drawing/2010/main" xmlns="">
+                          <a14:hiddenFill xmlns="" xmlns:a14="http://schemas.microsoft.com/office/drawing/2010/main">
                             <a:solidFill>
                               <a:srgbClr val="FFFFFF"/>
                             </a:solidFill>
@@ -24718,7 +24805,7 @@
                       <a:noFill/>
                       <a:extLst>
                         <a:ext uri="{909E8E84-426E-40dd-AFC4-6F175D3DCCD1}">
-                          <a14:hiddenFill xmlns:a14="http://schemas.microsoft.com/office/drawing/2010/main" xmlns="">
+                          <a14:hiddenFill xmlns="" xmlns:a14="http://schemas.microsoft.com/office/drawing/2010/main">
                             <a:solidFill>
                               <a:srgbClr val="FFFFFF"/>
                             </a:solidFill>
@@ -24912,7 +24999,7 @@
                       <a:noFill/>
                       <a:extLst>
                         <a:ext uri="{909E8E84-426E-40dd-AFC4-6F175D3DCCD1}">
-                          <a14:hiddenFill xmlns:a14="http://schemas.microsoft.com/office/drawing/2010/main" xmlns="">
+                          <a14:hiddenFill xmlns="" xmlns:a14="http://schemas.microsoft.com/office/drawing/2010/main">
                             <a:solidFill>
                               <a:srgbClr val="FFFFFF"/>
                             </a:solidFill>
@@ -25120,7 +25207,7 @@
                       <a:noFill/>
                       <a:extLst>
                         <a:ext uri="{909E8E84-426E-40dd-AFC4-6F175D3DCCD1}">
-                          <a14:hiddenFill xmlns:a14="http://schemas.microsoft.com/office/drawing/2010/main" xmlns="">
+                          <a14:hiddenFill xmlns="" xmlns:a14="http://schemas.microsoft.com/office/drawing/2010/main">
                             <a:solidFill>
                               <a:srgbClr val="FFFFFF"/>
                             </a:solidFill>
@@ -25561,7 +25648,7 @@
                       <a:noFill/>
                       <a:extLst>
                         <a:ext uri="{909E8E84-426E-40dd-AFC4-6F175D3DCCD1}">
-                          <a14:hiddenFill xmlns:a14="http://schemas.microsoft.com/office/drawing/2010/main" xmlns="">
+                          <a14:hiddenFill xmlns="" xmlns:a14="http://schemas.microsoft.com/office/drawing/2010/main">
                             <a:solidFill>
                               <a:srgbClr val="FFFFFF"/>
                             </a:solidFill>
@@ -25631,7 +25718,7 @@
                       <a:noFill/>
                       <a:extLst>
                         <a:ext uri="{909E8E84-426E-40dd-AFC4-6F175D3DCCD1}">
-                          <a14:hiddenFill xmlns:a14="http://schemas.microsoft.com/office/drawing/2010/main" xmlns="">
+                          <a14:hiddenFill xmlns="" xmlns:a14="http://schemas.microsoft.com/office/drawing/2010/main">
                             <a:solidFill>
                               <a:srgbClr val="FFFFFF"/>
                             </a:solidFill>
@@ -25792,7 +25879,7 @@
                       <a:noFill/>
                       <a:extLst>
                         <a:ext uri="{909E8E84-426E-40dd-AFC4-6F175D3DCCD1}">
-                          <a14:hiddenFill xmlns:a14="http://schemas.microsoft.com/office/drawing/2010/main" xmlns="">
+                          <a14:hiddenFill xmlns="" xmlns:a14="http://schemas.microsoft.com/office/drawing/2010/main">
                             <a:solidFill>
                               <a:srgbClr val="FFFFFF"/>
                             </a:solidFill>
@@ -25862,7 +25949,7 @@
                       <a:noFill/>
                       <a:extLst>
                         <a:ext uri="{909E8E84-426E-40dd-AFC4-6F175D3DCCD1}">
-                          <a14:hiddenFill xmlns:a14="http://schemas.microsoft.com/office/drawing/2010/main" xmlns="">
+                          <a14:hiddenFill xmlns="" xmlns:a14="http://schemas.microsoft.com/office/drawing/2010/main">
                             <a:solidFill>
                               <a:srgbClr val="FFFFFF"/>
                             </a:solidFill>
@@ -25932,7 +26019,7 @@
                       <a:noFill/>
                       <a:extLst>
                         <a:ext uri="{909E8E84-426E-40dd-AFC4-6F175D3DCCD1}">
-                          <a14:hiddenFill xmlns:a14="http://schemas.microsoft.com/office/drawing/2010/main" xmlns="">
+                          <a14:hiddenFill xmlns="" xmlns:a14="http://schemas.microsoft.com/office/drawing/2010/main">
                             <a:solidFill>
                               <a:srgbClr val="FFFFFF"/>
                             </a:solidFill>
@@ -27694,7 +27781,7 @@
                       <a:noFill/>
                       <a:extLst>
                         <a:ext uri="{909E8E84-426E-40dd-AFC4-6F175D3DCCD1}">
-                          <a14:hiddenFill xmlns:a14="http://schemas.microsoft.com/office/drawing/2010/main" xmlns="">
+                          <a14:hiddenFill xmlns="" xmlns:a14="http://schemas.microsoft.com/office/drawing/2010/main">
                             <a:solidFill>
                               <a:srgbClr val="FFFFFF"/>
                             </a:solidFill>
@@ -27900,7 +27987,7 @@
                       <a:noFill/>
                       <a:extLst>
                         <a:ext uri="{909E8E84-426E-40dd-AFC4-6F175D3DCCD1}">
-                          <a14:hiddenFill xmlns:a14="http://schemas.microsoft.com/office/drawing/2010/main" xmlns="">
+                          <a14:hiddenFill xmlns="" xmlns:a14="http://schemas.microsoft.com/office/drawing/2010/main">
                             <a:solidFill>
                               <a:srgbClr val="FFFFFF"/>
                             </a:solidFill>
@@ -28201,7 +28288,7 @@
                       <a:noFill/>
                       <a:extLst>
                         <a:ext uri="{909E8E84-426E-40dd-AFC4-6F175D3DCCD1}">
-                          <a14:hiddenFill xmlns:a14="http://schemas.microsoft.com/office/drawing/2010/main" xmlns="">
+                          <a14:hiddenFill xmlns="" xmlns:a14="http://schemas.microsoft.com/office/drawing/2010/main">
                             <a:solidFill>
                               <a:srgbClr val="FFFFFF"/>
                             </a:solidFill>
@@ -28271,7 +28358,7 @@
                       <a:noFill/>
                       <a:extLst>
                         <a:ext uri="{909E8E84-426E-40dd-AFC4-6F175D3DCCD1}">
-                          <a14:hiddenFill xmlns:a14="http://schemas.microsoft.com/office/drawing/2010/main" xmlns="">
+                          <a14:hiddenFill xmlns="" xmlns:a14="http://schemas.microsoft.com/office/drawing/2010/main">
                             <a:solidFill>
                               <a:srgbClr val="FFFFFF"/>
                             </a:solidFill>
@@ -28341,7 +28428,7 @@
                       <a:noFill/>
                       <a:extLst>
                         <a:ext uri="{909E8E84-426E-40dd-AFC4-6F175D3DCCD1}">
-                          <a14:hiddenFill xmlns:a14="http://schemas.microsoft.com/office/drawing/2010/main" xmlns="">
+                          <a14:hiddenFill xmlns="" xmlns:a14="http://schemas.microsoft.com/office/drawing/2010/main">
                             <a:solidFill>
                               <a:srgbClr val="FFFFFF"/>
                             </a:solidFill>
@@ -28411,7 +28498,7 @@
                       <a:noFill/>
                       <a:extLst>
                         <a:ext uri="{909E8E84-426E-40dd-AFC4-6F175D3DCCD1}">
-                          <a14:hiddenFill xmlns:a14="http://schemas.microsoft.com/office/drawing/2010/main" xmlns="">
+                          <a14:hiddenFill xmlns="" xmlns:a14="http://schemas.microsoft.com/office/drawing/2010/main">
                             <a:solidFill>
                               <a:srgbClr val="FFFFFF"/>
                             </a:solidFill>
@@ -28842,7 +28929,7 @@
                       <a:noFill/>
                       <a:extLst>
                         <a:ext uri="{909E8E84-426E-40dd-AFC4-6F175D3DCCD1}">
-                          <a14:hiddenFill xmlns:a14="http://schemas.microsoft.com/office/drawing/2010/main" xmlns="">
+                          <a14:hiddenFill xmlns="" xmlns:a14="http://schemas.microsoft.com/office/drawing/2010/main">
                             <a:solidFill>
                               <a:srgbClr val="FFFFFF"/>
                             </a:solidFill>
@@ -29143,7 +29230,7 @@
                       <a:noFill/>
                       <a:extLst>
                         <a:ext uri="{909E8E84-426E-40dd-AFC4-6F175D3DCCD1}">
-                          <a14:hiddenFill xmlns:a14="http://schemas.microsoft.com/office/drawing/2010/main" xmlns="">
+                          <a14:hiddenFill xmlns="" xmlns:a14="http://schemas.microsoft.com/office/drawing/2010/main">
                             <a:solidFill>
                               <a:srgbClr val="FFFFFF"/>
                             </a:solidFill>
@@ -29451,7 +29538,7 @@
                       <a:noFill/>
                       <a:extLst>
                         <a:ext uri="{909E8E84-426E-40dd-AFC4-6F175D3DCCD1}">
-                          <a14:hiddenFill xmlns:a14="http://schemas.microsoft.com/office/drawing/2010/main" xmlns="">
+                          <a14:hiddenFill xmlns="" xmlns:a14="http://schemas.microsoft.com/office/drawing/2010/main">
                             <a:solidFill>
                               <a:srgbClr val="FFFFFF"/>
                             </a:solidFill>
@@ -29521,7 +29608,7 @@
                       <a:noFill/>
                       <a:extLst>
                         <a:ext uri="{909E8E84-426E-40dd-AFC4-6F175D3DCCD1}">
-                          <a14:hiddenFill xmlns:a14="http://schemas.microsoft.com/office/drawing/2010/main" xmlns="">
+                          <a14:hiddenFill xmlns="" xmlns:a14="http://schemas.microsoft.com/office/drawing/2010/main">
                             <a:solidFill>
                               <a:srgbClr val="FFFFFF"/>
                             </a:solidFill>
@@ -29744,7 +29831,7 @@
                       <a:noFill/>
                       <a:extLst>
                         <a:ext uri="{909E8E84-426E-40dd-AFC4-6F175D3DCCD1}">
-                          <a14:hiddenFill xmlns:a14="http://schemas.microsoft.com/office/drawing/2010/main" xmlns="">
+                          <a14:hiddenFill xmlns="" xmlns:a14="http://schemas.microsoft.com/office/drawing/2010/main">
                             <a:solidFill>
                               <a:srgbClr val="FFFFFF"/>
                             </a:solidFill>
@@ -29814,7 +29901,7 @@
                       <a:noFill/>
                       <a:extLst>
                         <a:ext uri="{909E8E84-426E-40dd-AFC4-6F175D3DCCD1}">
-                          <a14:hiddenFill xmlns:a14="http://schemas.microsoft.com/office/drawing/2010/main" xmlns="">
+                          <a14:hiddenFill xmlns="" xmlns:a14="http://schemas.microsoft.com/office/drawing/2010/main">
                             <a:solidFill>
                               <a:srgbClr val="FFFFFF"/>
                             </a:solidFill>
@@ -29884,7 +29971,7 @@
                       <a:noFill/>
                       <a:extLst>
                         <a:ext uri="{909E8E84-426E-40dd-AFC4-6F175D3DCCD1}">
-                          <a14:hiddenFill xmlns:a14="http://schemas.microsoft.com/office/drawing/2010/main" xmlns="">
+                          <a14:hiddenFill xmlns="" xmlns:a14="http://schemas.microsoft.com/office/drawing/2010/main">
                             <a:solidFill>
                               <a:srgbClr val="FFFFFF"/>
                             </a:solidFill>
@@ -30218,7 +30305,7 @@
                       <a:noFill/>
                       <a:extLst>
                         <a:ext uri="{909E8E84-426E-40dd-AFC4-6F175D3DCCD1}">
-                          <a14:hiddenFill xmlns:a14="http://schemas.microsoft.com/office/drawing/2010/main" xmlns="">
+                          <a14:hiddenFill xmlns="" xmlns:a14="http://schemas.microsoft.com/office/drawing/2010/main">
                             <a:solidFill>
                               <a:srgbClr val="FFFFFF"/>
                             </a:solidFill>
@@ -30321,7 +30408,7 @@
                       <a:noFill/>
                       <a:extLst>
                         <a:ext uri="{909E8E84-426E-40dd-AFC4-6F175D3DCCD1}">
-                          <a14:hiddenFill xmlns:a14="http://schemas.microsoft.com/office/drawing/2010/main" xmlns="">
+                          <a14:hiddenFill xmlns="" xmlns:a14="http://schemas.microsoft.com/office/drawing/2010/main">
                             <a:solidFill>
                               <a:srgbClr val="FFFFFF"/>
                             </a:solidFill>
@@ -30391,7 +30478,7 @@
                       <a:noFill/>
                       <a:extLst>
                         <a:ext uri="{909E8E84-426E-40dd-AFC4-6F175D3DCCD1}">
-                          <a14:hiddenFill xmlns:a14="http://schemas.microsoft.com/office/drawing/2010/main" xmlns="">
+                          <a14:hiddenFill xmlns="" xmlns:a14="http://schemas.microsoft.com/office/drawing/2010/main">
                             <a:solidFill>
                               <a:srgbClr val="FFFFFF"/>
                             </a:solidFill>
@@ -30461,7 +30548,7 @@
                       <a:noFill/>
                       <a:extLst>
                         <a:ext uri="{909E8E84-426E-40dd-AFC4-6F175D3DCCD1}">
-                          <a14:hiddenFill xmlns:a14="http://schemas.microsoft.com/office/drawing/2010/main" xmlns="">
+                          <a14:hiddenFill xmlns="" xmlns:a14="http://schemas.microsoft.com/office/drawing/2010/main">
                             <a:solidFill>
                               <a:srgbClr val="FFFFFF"/>
                             </a:solidFill>
@@ -30823,7 +30910,7 @@
                       <a:noFill/>
                       <a:extLst>
                         <a:ext uri="{909E8E84-426E-40dd-AFC4-6F175D3DCCD1}">
-                          <a14:hiddenFill xmlns:a14="http://schemas.microsoft.com/office/drawing/2010/main" xmlns="">
+                          <a14:hiddenFill xmlns="" xmlns:a14="http://schemas.microsoft.com/office/drawing/2010/main">
                             <a:solidFill>
                               <a:srgbClr val="FFFFFF"/>
                             </a:solidFill>
@@ -31073,7 +31160,7 @@
                       <a:noFill/>
                       <a:extLst>
                         <a:ext uri="{909E8E84-426E-40dd-AFC4-6F175D3DCCD1}">
-                          <a14:hiddenFill xmlns:a14="http://schemas.microsoft.com/office/drawing/2010/main" xmlns="">
+                          <a14:hiddenFill xmlns="" xmlns:a14="http://schemas.microsoft.com/office/drawing/2010/main">
                             <a:solidFill>
                               <a:srgbClr val="FFFFFF"/>
                             </a:solidFill>
@@ -31149,7 +31236,7 @@
                       <a:noFill/>
                       <a:extLst>
                         <a:ext uri="{909E8E84-426E-40dd-AFC4-6F175D3DCCD1}">
-                          <a14:hiddenFill xmlns:a14="http://schemas.microsoft.com/office/drawing/2010/main" xmlns="">
+                          <a14:hiddenFill xmlns="" xmlns:a14="http://schemas.microsoft.com/office/drawing/2010/main">
                             <a:solidFill>
                               <a:srgbClr val="FFFFFF"/>
                             </a:solidFill>
@@ -31295,7 +31382,7 @@
                       <a:noFill/>
                       <a:extLst>
                         <a:ext uri="{909E8E84-426E-40dd-AFC4-6F175D3DCCD1}">
-                          <a14:hiddenFill xmlns:a14="http://schemas.microsoft.com/office/drawing/2010/main" xmlns="">
+                          <a14:hiddenFill xmlns="" xmlns:a14="http://schemas.microsoft.com/office/drawing/2010/main">
                             <a:solidFill>
                               <a:srgbClr val="FFFFFF"/>
                             </a:solidFill>
@@ -31451,7 +31538,7 @@
                       <a:noFill/>
                       <a:extLst>
                         <a:ext uri="{909E8E84-426E-40dd-AFC4-6F175D3DCCD1}">
-                          <a14:hiddenFill xmlns:a14="http://schemas.microsoft.com/office/drawing/2010/main" xmlns="">
+                          <a14:hiddenFill xmlns="" xmlns:a14="http://schemas.microsoft.com/office/drawing/2010/main">
                             <a:solidFill>
                               <a:srgbClr val="FFFFFF"/>
                             </a:solidFill>
@@ -31490,13 +31577,8 @@
           <a:p>
             <a:r>
               <a:rPr lang="en-US" sz="2400" dirty="0"/>
-              <a:t>If we minimize this loss function, in practice, the results aren’t great and we tend to </a:t>
-            </a:r>
-            <a:r>
-              <a:rPr lang="en-US" sz="2400" dirty="0" err="1"/>
-              <a:t>overfit</a:t>
-            </a:r>
-            <a:endParaRPr lang="en-US" sz="2400" dirty="0"/>
+              <a:t>If we minimize this loss function, in practice, the results aren’t great, and we tend to overfit.</a:t>
+            </a:r>
           </a:p>
         </p:txBody>
       </p:sp>
@@ -34246,7 +34328,7 @@
                       <a:noFill/>
                       <a:extLst>
                         <a:ext uri="{909E8E84-426E-40dd-AFC4-6F175D3DCCD1}">
-                          <a14:hiddenFill xmlns:a14="http://schemas.microsoft.com/office/drawing/2010/main" xmlns="">
+                          <a14:hiddenFill xmlns="" xmlns:a14="http://schemas.microsoft.com/office/drawing/2010/main">
                             <a:solidFill>
                               <a:srgbClr val="FFFFFF"/>
                             </a:solidFill>
@@ -34303,8 +34385,8 @@
         </p:nvSpPr>
         <p:spPr>
           <a:xfrm>
-            <a:off x="612648" y="76200"/>
-            <a:ext cx="8153400" cy="990600"/>
+            <a:off x="228600" y="76200"/>
+            <a:ext cx="8537448" cy="990600"/>
           </a:xfrm>
         </p:spPr>
         <p:txBody>
@@ -34315,14 +34397,7 @@
           <a:p>
             <a:r>
               <a:rPr lang="en-US" dirty="0"/>
-              <a:t>A digression: </a:t>
-            </a:r>
-            <a:br>
-              <a:rPr lang="en-US" dirty="0"/>
-            </a:br>
-            <a:r>
-              <a:rPr lang="en-US" dirty="0"/>
-              <a:t>regression vs. classification</a:t>
+              <a:t>A digression: regression vs. classification</a:t>
             </a:r>
           </a:p>
         </p:txBody>
@@ -36630,7 +36705,7 @@
           <a:p>
             <a:r>
               <a:rPr lang="en-US" dirty="0"/>
-              <a:t>Our model is a line, i.e. we’re assuming a linear relationship between the feature and the label value</a:t>
+              <a:t>Our model is a line, i.e., we’re assuming a linear relationship between the feature and the label value</a:t>
             </a:r>
           </a:p>
         </p:txBody>
@@ -36829,7 +36904,7 @@
                       <a:noFill/>
                       <a:extLst>
                         <a:ext uri="{909E8E84-426E-40dd-AFC4-6F175D3DCCD1}">
-                          <a14:hiddenFill xmlns:a14="http://schemas.microsoft.com/office/drawing/2010/main" xmlns="">
+                          <a14:hiddenFill xmlns="" xmlns:a14="http://schemas.microsoft.com/office/drawing/2010/main">
                             <a:solidFill>
                               <a:srgbClr val="FFFFFF"/>
                             </a:solidFill>
@@ -38202,7 +38277,7 @@
                       <a:noFill/>
                       <a:extLst>
                         <a:ext uri="{909E8E84-426E-40dd-AFC4-6F175D3DCCD1}">
-                          <a14:hiddenFill xmlns:a14="http://schemas.microsoft.com/office/drawing/2010/main" xmlns="">
+                          <a14:hiddenFill xmlns="" xmlns:a14="http://schemas.microsoft.com/office/drawing/2010/main">
                             <a:solidFill>
                               <a:srgbClr val="FFFFFF"/>
                             </a:solidFill>
@@ -38395,7 +38470,7 @@
                         <a:noFill/>
                         <a:extLst>
                           <a:ext uri="{909E8E84-426E-40dd-AFC4-6F175D3DCCD1}">
-                            <a14:hiddenFill xmlns:a14="http://schemas.microsoft.com/office/drawing/2010/main" xmlns="">
+                            <a14:hiddenFill xmlns="" xmlns:a14="http://schemas.microsoft.com/office/drawing/2010/main">
                               <a:solidFill>
                                 <a:srgbClr val="FFFFFF"/>
                               </a:solidFill>
@@ -38790,7 +38865,7 @@
                       <a:noFill/>
                       <a:extLst>
                         <a:ext uri="{909E8E84-426E-40dd-AFC4-6F175D3DCCD1}">
-                          <a14:hiddenFill xmlns:a14="http://schemas.microsoft.com/office/drawing/2010/main" xmlns="">
+                          <a14:hiddenFill xmlns="" xmlns:a14="http://schemas.microsoft.com/office/drawing/2010/main">
                             <a:solidFill>
                               <a:srgbClr val="FFFFFF"/>
                             </a:solidFill>
@@ -39988,7 +40063,7 @@
                       <a:noFill/>
                       <a:extLst>
                         <a:ext uri="{909E8E84-426E-40dd-AFC4-6F175D3DCCD1}">
-                          <a14:hiddenFill xmlns:a14="http://schemas.microsoft.com/office/drawing/2010/main" xmlns="">
+                          <a14:hiddenFill xmlns="" xmlns:a14="http://schemas.microsoft.com/office/drawing/2010/main">
                             <a:solidFill>
                               <a:srgbClr val="FFFFFF"/>
                             </a:solidFill>
@@ -40116,7 +40191,7 @@
                       <a:noFill/>
                       <a:extLst>
                         <a:ext uri="{909E8E84-426E-40dd-AFC4-6F175D3DCCD1}">
-                          <a14:hiddenFill xmlns:a14="http://schemas.microsoft.com/office/drawing/2010/main" xmlns="">
+                          <a14:hiddenFill xmlns="" xmlns:a14="http://schemas.microsoft.com/office/drawing/2010/main">
                             <a:solidFill>
                               <a:srgbClr val="FFFFFF"/>
                             </a:solidFill>
@@ -41303,7 +41378,7 @@
                       <a:noFill/>
                       <a:extLst>
                         <a:ext uri="{909E8E84-426E-40dd-AFC4-6F175D3DCCD1}">
-                          <a14:hiddenFill xmlns:a14="http://schemas.microsoft.com/office/drawing/2010/main" xmlns="">
+                          <a14:hiddenFill xmlns="" xmlns:a14="http://schemas.microsoft.com/office/drawing/2010/main">
                             <a:solidFill>
                               <a:srgbClr val="FFFFFF"/>
                             </a:solidFill>
@@ -41373,7 +41448,7 @@
                       <a:noFill/>
                       <a:extLst>
                         <a:ext uri="{909E8E84-426E-40dd-AFC4-6F175D3DCCD1}">
-                          <a14:hiddenFill xmlns:a14="http://schemas.microsoft.com/office/drawing/2010/main" xmlns="">
+                          <a14:hiddenFill xmlns="" xmlns:a14="http://schemas.microsoft.com/office/drawing/2010/main">
                             <a:solidFill>
                               <a:srgbClr val="FFFFFF"/>
                             </a:solidFill>
@@ -41778,7 +41853,7 @@
                       <a:noFill/>
                       <a:extLst>
                         <a:ext uri="{909E8E84-426E-40dd-AFC4-6F175D3DCCD1}">
-                          <a14:hiddenFill xmlns:a14="http://schemas.microsoft.com/office/drawing/2010/main" xmlns="">
+                          <a14:hiddenFill xmlns="" xmlns:a14="http://schemas.microsoft.com/office/drawing/2010/main">
                             <a:solidFill>
                               <a:srgbClr val="FFFFFF"/>
                             </a:solidFill>
@@ -41954,7 +42029,7 @@
                       <a:noFill/>
                       <a:extLst>
                         <a:ext uri="{909E8E84-426E-40dd-AFC4-6F175D3DCCD1}">
-                          <a14:hiddenFill xmlns:a14="http://schemas.microsoft.com/office/drawing/2010/main" xmlns="">
+                          <a14:hiddenFill xmlns="" xmlns:a14="http://schemas.microsoft.com/office/drawing/2010/main">
                             <a:solidFill>
                               <a:srgbClr val="FFFFFF"/>
                             </a:solidFill>
@@ -42207,7 +42282,7 @@
                       <a:noFill/>
                       <a:extLst>
                         <a:ext uri="{909E8E84-426E-40dd-AFC4-6F175D3DCCD1}">
-                          <a14:hiddenFill xmlns:a14="http://schemas.microsoft.com/office/drawing/2010/main" xmlns="">
+                          <a14:hiddenFill xmlns="" xmlns:a14="http://schemas.microsoft.com/office/drawing/2010/main">
                             <a:solidFill>
                               <a:srgbClr val="FFFFFF"/>
                             </a:solidFill>
@@ -42310,7 +42385,7 @@
                       <a:noFill/>
                       <a:extLst>
                         <a:ext uri="{909E8E84-426E-40dd-AFC4-6F175D3DCCD1}">
-                          <a14:hiddenFill xmlns:a14="http://schemas.microsoft.com/office/drawing/2010/main" xmlns="">
+                          <a14:hiddenFill xmlns="" xmlns:a14="http://schemas.microsoft.com/office/drawing/2010/main">
                             <a:solidFill>
                               <a:srgbClr val="FFFFFF"/>
                             </a:solidFill>
@@ -42456,7 +42531,7 @@
                       <a:noFill/>
                       <a:extLst>
                         <a:ext uri="{909E8E84-426E-40dd-AFC4-6F175D3DCCD1}">
-                          <a14:hiddenFill xmlns:a14="http://schemas.microsoft.com/office/drawing/2010/main" xmlns="">
+                          <a14:hiddenFill xmlns="" xmlns:a14="http://schemas.microsoft.com/office/drawing/2010/main">
                             <a:solidFill>
                               <a:srgbClr val="FFFFFF"/>
                             </a:solidFill>
@@ -42689,7 +42764,7 @@
             </a:pPr>
             <a:r>
               <a:rPr lang="en-US" dirty="0"/>
-              <a:t>Which model do we use, i.e. how do we calculate p(</a:t>
+              <a:t>Which model do we use, i.e., how do we calculate p(</a:t>
             </a:r>
             <a:r>
               <a:rPr lang="en-US" i="1" dirty="0"/>
@@ -43175,15 +43250,7 @@
             <a:pPr marL="822960" lvl="1" indent="-457200"/>
             <a:r>
               <a:rPr lang="en-US" dirty="0"/>
-              <a:t>In practice: avoids </a:t>
-            </a:r>
-            <a:r>
-              <a:rPr lang="en-US" dirty="0" err="1"/>
-              <a:t>overfitting</a:t>
-            </a:r>
-            <a:r>
-              <a:rPr lang="en-US" dirty="0"/>
-              <a:t> and often tune on development data</a:t>
+              <a:t>In practice: avoids overfitting and often tune on development data</a:t>
             </a:r>
           </a:p>
         </p:txBody>

</xml_diff>